<commit_message>
adding a new helm deployement package
</commit_message>
<xml_diff>
--- a/K8.DotNetCore.Workshop.pptx
+++ b/K8.DotNetCore.Workshop.pptx
@@ -105,6 +105,11 @@
       </a:defRPr>
     </a:lvl9pPr>
   </p:defaultTextStyle>
+  <p:extLst>
+    <p:ext uri="{EFAFB233-063F-42B5-8137-9DF3F51BA10A}">
+      <p15:sldGuideLst xmlns:p15="http://schemas.microsoft.com/office/powerpoint/2012/main"/>
+    </p:ext>
+  </p:extLst>
 </p:presentation>
 </file>
 
@@ -511,7 +516,7 @@
           <a:p>
             <a:fld id="{B45A4778-A22A-446A-9ABB-989FC66F7673}" type="datetimeFigureOut">
               <a:rPr lang="en-US" smtClean="0"/>
-              <a:t>10/2/2019</a:t>
+              <a:t>10/3/2019</a:t>
             </a:fld>
             <a:endParaRPr lang="en-US"/>
           </a:p>
@@ -690,7 +695,7 @@
           <a:p>
             <a:fld id="{B45A4778-A22A-446A-9ABB-989FC66F7673}" type="datetimeFigureOut">
               <a:rPr lang="en-US" smtClean="0"/>
-              <a:t>10/2/2019</a:t>
+              <a:t>10/3/2019</a:t>
             </a:fld>
             <a:endParaRPr lang="en-US"/>
           </a:p>
@@ -870,7 +875,7 @@
           <a:p>
             <a:fld id="{B45A4778-A22A-446A-9ABB-989FC66F7673}" type="datetimeFigureOut">
               <a:rPr lang="en-US" smtClean="0"/>
-              <a:t>10/2/2019</a:t>
+              <a:t>10/3/2019</a:t>
             </a:fld>
             <a:endParaRPr lang="en-US"/>
           </a:p>
@@ -1040,7 +1045,7 @@
           <a:p>
             <a:fld id="{B45A4778-A22A-446A-9ABB-989FC66F7673}" type="datetimeFigureOut">
               <a:rPr lang="en-US" smtClean="0"/>
-              <a:t>10/2/2019</a:t>
+              <a:t>10/3/2019</a:t>
             </a:fld>
             <a:endParaRPr lang="en-US"/>
           </a:p>
@@ -1353,7 +1358,7 @@
           <a:p>
             <a:fld id="{B45A4778-A22A-446A-9ABB-989FC66F7673}" type="datetimeFigureOut">
               <a:rPr lang="en-US" smtClean="0"/>
-              <a:t>10/2/2019</a:t>
+              <a:t>10/3/2019</a:t>
             </a:fld>
             <a:endParaRPr lang="en-US"/>
           </a:p>
@@ -1739,7 +1744,7 @@
           <a:p>
             <a:fld id="{B45A4778-A22A-446A-9ABB-989FC66F7673}" type="datetimeFigureOut">
               <a:rPr lang="en-US" smtClean="0"/>
-              <a:t>10/2/2019</a:t>
+              <a:t>10/3/2019</a:t>
             </a:fld>
             <a:endParaRPr lang="en-US"/>
           </a:p>
@@ -2178,7 +2183,7 @@
           <a:p>
             <a:fld id="{B45A4778-A22A-446A-9ABB-989FC66F7673}" type="datetimeFigureOut">
               <a:rPr lang="en-US" smtClean="0"/>
-              <a:t>10/2/2019</a:t>
+              <a:t>10/3/2019</a:t>
             </a:fld>
             <a:endParaRPr lang="en-US"/>
           </a:p>
@@ -2301,7 +2306,7 @@
           <a:p>
             <a:fld id="{B45A4778-A22A-446A-9ABB-989FC66F7673}" type="datetimeFigureOut">
               <a:rPr lang="en-US" smtClean="0"/>
-              <a:t>10/2/2019</a:t>
+              <a:t>10/3/2019</a:t>
             </a:fld>
             <a:endParaRPr lang="en-US"/>
           </a:p>
@@ -2396,7 +2401,7 @@
           <a:p>
             <a:fld id="{B45A4778-A22A-446A-9ABB-989FC66F7673}" type="datetimeFigureOut">
               <a:rPr lang="en-US" smtClean="0"/>
-              <a:t>10/2/2019</a:t>
+              <a:t>10/3/2019</a:t>
             </a:fld>
             <a:endParaRPr lang="en-US"/>
           </a:p>
@@ -2746,7 +2751,7 @@
           <a:p>
             <a:fld id="{B45A4778-A22A-446A-9ABB-989FC66F7673}" type="datetimeFigureOut">
               <a:rPr lang="en-US" smtClean="0"/>
-              <a:t>10/2/2019</a:t>
+              <a:t>10/3/2019</a:t>
             </a:fld>
             <a:endParaRPr lang="en-US"/>
           </a:p>
@@ -3176,7 +3181,7 @@
           <a:p>
             <a:fld id="{B45A4778-A22A-446A-9ABB-989FC66F7673}" type="datetimeFigureOut">
               <a:rPr lang="en-US" smtClean="0"/>
-              <a:t>10/2/2019</a:t>
+              <a:t>10/3/2019</a:t>
             </a:fld>
             <a:endParaRPr lang="en-US"/>
           </a:p>
@@ -3457,7 +3462,7 @@
           <a:p>
             <a:fld id="{B45A4778-A22A-446A-9ABB-989FC66F7673}" type="datetimeFigureOut">
               <a:rPr lang="en-US" smtClean="0"/>
-              <a:t>10/2/2019</a:t>
+              <a:t>10/3/2019</a:t>
             </a:fld>
             <a:endParaRPr lang="en-US"/>
           </a:p>
@@ -4606,32 +4611,210 @@
           <a:bodyPr/>
           <a:lstStyle/>
           <a:p>
-            <a:endParaRPr lang="en-US" dirty="0"/>
-          </a:p>
-        </p:txBody>
-      </p:sp>
-      <p:sp>
-        <p:nvSpPr>
-          <p:cNvPr id="3" name="Content Placeholder 2">
+            <a:r>
+              <a:rPr lang="en-US" dirty="0"/>
+              <a:t>Application Structure</a:t>
+            </a:r>
+          </a:p>
+        </p:txBody>
+      </p:sp>
+      <p:sp>
+        <p:nvSpPr>
+          <p:cNvPr id="4" name="Rectangle 3">
             <a:extLst>
               <a:ext uri="{FF2B5EF4-FFF2-40B4-BE49-F238E27FC236}">
-                <a16:creationId xmlns:a16="http://schemas.microsoft.com/office/drawing/2014/main" id="{1A0C99A3-3B08-4E41-B78F-6AEE4A82A09C}"/>
+                <a16:creationId xmlns:a16="http://schemas.microsoft.com/office/drawing/2014/main" id="{A1235E23-B560-4422-83FE-62DECB014EFE}"/>
               </a:ext>
             </a:extLst>
           </p:cNvPr>
-          <p:cNvSpPr>
-            <a:spLocks noGrp="1"/>
-          </p:cNvSpPr>
-          <p:nvPr>
-            <p:ph idx="1"/>
-          </p:nvPr>
-        </p:nvSpPr>
-        <p:spPr/>
-        <p:txBody>
-          <a:bodyPr/>
+          <p:cNvSpPr/>
+          <p:nvPr/>
+        </p:nvSpPr>
+        <p:spPr>
+          <a:xfrm>
+            <a:off x="8202967" y="2574524"/>
+            <a:ext cx="2121763" cy="1367161"/>
+          </a:xfrm>
+          <a:prstGeom prst="rect">
+            <a:avLst/>
+          </a:prstGeom>
+        </p:spPr>
+        <p:style>
+          <a:lnRef idx="2">
+            <a:schemeClr val="accent1">
+              <a:shade val="50000"/>
+            </a:schemeClr>
+          </a:lnRef>
+          <a:fillRef idx="1">
+            <a:schemeClr val="accent1"/>
+          </a:fillRef>
+          <a:effectRef idx="0">
+            <a:schemeClr val="accent1"/>
+          </a:effectRef>
+          <a:fontRef idx="minor">
+            <a:schemeClr val="lt1"/>
+          </a:fontRef>
+        </p:style>
+        <p:txBody>
+          <a:bodyPr rtlCol="0" anchor="ctr"/>
           <a:lstStyle/>
           <a:p>
+            <a:pPr algn="ctr"/>
+            <a:r>
+              <a:rPr lang="en-US" dirty="0"/>
+              <a:t>Import </a:t>
+            </a:r>
+            <a:r>
+              <a:rPr lang="en-US" dirty="0" err="1"/>
+              <a:t>CronJob</a:t>
+            </a:r>
             <a:endParaRPr lang="en-US" dirty="0"/>
+          </a:p>
+        </p:txBody>
+      </p:sp>
+      <p:sp>
+        <p:nvSpPr>
+          <p:cNvPr id="6" name="Rectangle 5">
+            <a:extLst>
+              <a:ext uri="{FF2B5EF4-FFF2-40B4-BE49-F238E27FC236}">
+                <a16:creationId xmlns:a16="http://schemas.microsoft.com/office/drawing/2014/main" id="{4F8EFD7C-E468-4AFE-9E01-F581A118CFD6}"/>
+              </a:ext>
+            </a:extLst>
+          </p:cNvPr>
+          <p:cNvSpPr/>
+          <p:nvPr/>
+        </p:nvSpPr>
+        <p:spPr>
+          <a:xfrm>
+            <a:off x="8507767" y="3562904"/>
+            <a:ext cx="2121763" cy="1367161"/>
+          </a:xfrm>
+          <a:prstGeom prst="rect">
+            <a:avLst/>
+          </a:prstGeom>
+        </p:spPr>
+        <p:style>
+          <a:lnRef idx="2">
+            <a:schemeClr val="accent1">
+              <a:shade val="50000"/>
+            </a:schemeClr>
+          </a:lnRef>
+          <a:fillRef idx="1">
+            <a:schemeClr val="accent1"/>
+          </a:fillRef>
+          <a:effectRef idx="0">
+            <a:schemeClr val="accent1"/>
+          </a:effectRef>
+          <a:fontRef idx="minor">
+            <a:schemeClr val="lt1"/>
+          </a:fontRef>
+        </p:style>
+        <p:txBody>
+          <a:bodyPr rtlCol="0" anchor="ctr"/>
+          <a:lstStyle/>
+          <a:p>
+            <a:pPr algn="ctr"/>
+            <a:r>
+              <a:rPr lang="en-US" dirty="0"/>
+              <a:t>Convert </a:t>
+            </a:r>
+            <a:r>
+              <a:rPr lang="en-US" dirty="0" err="1"/>
+              <a:t>CronJob</a:t>
+            </a:r>
+            <a:endParaRPr lang="en-US" dirty="0"/>
+          </a:p>
+        </p:txBody>
+      </p:sp>
+      <p:sp>
+        <p:nvSpPr>
+          <p:cNvPr id="7" name="Rectangle 6">
+            <a:extLst>
+              <a:ext uri="{FF2B5EF4-FFF2-40B4-BE49-F238E27FC236}">
+                <a16:creationId xmlns:a16="http://schemas.microsoft.com/office/drawing/2014/main" id="{B385D399-0333-4A13-8F2C-FAC910170E57}"/>
+              </a:ext>
+            </a:extLst>
+          </p:cNvPr>
+          <p:cNvSpPr/>
+          <p:nvPr/>
+        </p:nvSpPr>
+        <p:spPr>
+          <a:xfrm>
+            <a:off x="4428478" y="3191522"/>
+            <a:ext cx="2414726" cy="1500326"/>
+          </a:xfrm>
+          <a:prstGeom prst="rect">
+            <a:avLst/>
+          </a:prstGeom>
+        </p:spPr>
+        <p:style>
+          <a:lnRef idx="2">
+            <a:schemeClr val="accent1">
+              <a:shade val="50000"/>
+            </a:schemeClr>
+          </a:lnRef>
+          <a:fillRef idx="1">
+            <a:schemeClr val="accent1"/>
+          </a:fillRef>
+          <a:effectRef idx="0">
+            <a:schemeClr val="accent1"/>
+          </a:effectRef>
+          <a:fontRef idx="minor">
+            <a:schemeClr val="lt1"/>
+          </a:fontRef>
+        </p:style>
+        <p:txBody>
+          <a:bodyPr rtlCol="0" anchor="ctr"/>
+          <a:lstStyle/>
+          <a:p>
+            <a:pPr algn="ctr"/>
+            <a:r>
+              <a:rPr lang="en-US" dirty="0" err="1"/>
+              <a:t>FrontEnd</a:t>
+            </a:r>
+            <a:r>
+              <a:rPr lang="en-US" dirty="0"/>
+              <a:t> – Web </a:t>
+            </a:r>
+            <a:r>
+              <a:rPr lang="en-US" dirty="0" err="1"/>
+              <a:t>Api</a:t>
+            </a:r>
+            <a:endParaRPr lang="en-US" dirty="0"/>
+          </a:p>
+        </p:txBody>
+      </p:sp>
+      <p:sp>
+        <p:nvSpPr>
+          <p:cNvPr id="8" name="Rectangle 7">
+            <a:extLst>
+              <a:ext uri="{FF2B5EF4-FFF2-40B4-BE49-F238E27FC236}">
+                <a16:creationId xmlns:a16="http://schemas.microsoft.com/office/drawing/2014/main" id="{15FF8BAE-1380-44BC-9E0D-BE13BA667F0B}"/>
+              </a:ext>
+            </a:extLst>
+          </p:cNvPr>
+          <p:cNvSpPr/>
+          <p:nvPr/>
+        </p:nvSpPr>
+        <p:spPr>
+          <a:xfrm>
+            <a:off x="1442293" y="4930065"/>
+            <a:ext cx="5251471" cy="369332"/>
+          </a:xfrm>
+          <a:prstGeom prst="rect">
+            <a:avLst/>
+          </a:prstGeom>
+        </p:spPr>
+        <p:txBody>
+          <a:bodyPr wrap="square">
+            <a:spAutoFit/>
+          </a:bodyPr>
+          <a:lstStyle/>
+          <a:p>
+            <a:r>
+              <a:rPr lang="en-US" dirty="0"/>
+              <a:t>http://k8-frontend-app.local/weatherforecast</a:t>
+            </a:r>
           </a:p>
         </p:txBody>
       </p:sp>

</xml_diff>

<commit_message>
adding documentations issue #1
</commit_message>
<xml_diff>
--- a/K8.DotNetCore.Workshop.pptx
+++ b/K8.DotNetCore.Workshop.pptx
@@ -7,6 +7,7 @@
   <p:sldIdLst>
     <p:sldId id="256" r:id="rId2"/>
     <p:sldId id="257" r:id="rId3"/>
+    <p:sldId id="258" r:id="rId4"/>
   </p:sldIdLst>
   <p:sldSz cx="12192000" cy="6858000"/>
   <p:notesSz cx="6858000" cy="9144000"/>
@@ -4686,7 +4687,7 @@
         </p:nvSpPr>
         <p:spPr>
           <a:xfrm>
-            <a:off x="8507767" y="3562904"/>
+            <a:off x="8202967" y="4246484"/>
             <a:ext cx="2121763" cy="1367161"/>
           </a:xfrm>
           <a:prstGeom prst="rect">
@@ -4740,7 +4741,7 @@
         </p:nvSpPr>
         <p:spPr>
           <a:xfrm>
-            <a:off x="4428478" y="3191522"/>
+            <a:off x="1574308" y="3191522"/>
             <a:ext cx="2414726" cy="1500326"/>
           </a:xfrm>
           <a:prstGeom prst="rect">
@@ -4822,6 +4823,473 @@
     <p:extLst>
       <p:ext uri="{BB962C8B-B14F-4D97-AF65-F5344CB8AC3E}">
         <p14:creationId xmlns:p14="http://schemas.microsoft.com/office/powerpoint/2010/main" val="3484762623"/>
+      </p:ext>
+    </p:extLst>
+  </p:cSld>
+  <p:clrMapOvr>
+    <a:masterClrMapping/>
+  </p:clrMapOvr>
+</p:sld>
+</file>
+
+<file path=ppt/slides/slide3.xml><?xml version="1.0" encoding="utf-8"?>
+<p:sld xmlns:a="http://schemas.openxmlformats.org/drawingml/2006/main" xmlns:r="http://schemas.openxmlformats.org/officeDocument/2006/relationships" xmlns:p="http://schemas.openxmlformats.org/presentationml/2006/main">
+  <p:cSld>
+    <p:spTree>
+      <p:nvGrpSpPr>
+        <p:cNvPr id="1" name=""/>
+        <p:cNvGrpSpPr/>
+        <p:nvPr/>
+      </p:nvGrpSpPr>
+      <p:grpSpPr>
+        <a:xfrm>
+          <a:off x="0" y="0"/>
+          <a:ext cx="0" cy="0"/>
+          <a:chOff x="0" y="0"/>
+          <a:chExt cx="0" cy="0"/>
+        </a:xfrm>
+      </p:grpSpPr>
+      <p:sp>
+        <p:nvSpPr>
+          <p:cNvPr id="2" name="Title 1">
+            <a:extLst>
+              <a:ext uri="{FF2B5EF4-FFF2-40B4-BE49-F238E27FC236}">
+                <a16:creationId xmlns:a16="http://schemas.microsoft.com/office/drawing/2014/main" id="{122FB90B-8716-4A7F-A48E-1D46239E8DED}"/>
+              </a:ext>
+            </a:extLst>
+          </p:cNvPr>
+          <p:cNvSpPr>
+            <a:spLocks noGrp="1"/>
+          </p:cNvSpPr>
+          <p:nvPr>
+            <p:ph type="title"/>
+          </p:nvPr>
+        </p:nvSpPr>
+        <p:spPr/>
+        <p:txBody>
+          <a:bodyPr/>
+          <a:lstStyle/>
+          <a:p>
+            <a:r>
+              <a:rPr lang="en-US" dirty="0"/>
+              <a:t>Docker Images</a:t>
+            </a:r>
+          </a:p>
+        </p:txBody>
+      </p:sp>
+      <p:sp>
+        <p:nvSpPr>
+          <p:cNvPr id="4" name="Rectangle 3">
+            <a:extLst>
+              <a:ext uri="{FF2B5EF4-FFF2-40B4-BE49-F238E27FC236}">
+                <a16:creationId xmlns:a16="http://schemas.microsoft.com/office/drawing/2014/main" id="{660BA86D-1B4E-4851-BE54-448F2BABD93D}"/>
+              </a:ext>
+            </a:extLst>
+          </p:cNvPr>
+          <p:cNvSpPr/>
+          <p:nvPr/>
+        </p:nvSpPr>
+        <p:spPr>
+          <a:xfrm>
+            <a:off x="745723" y="2475716"/>
+            <a:ext cx="2823099" cy="1731147"/>
+          </a:xfrm>
+          <a:prstGeom prst="rect">
+            <a:avLst/>
+          </a:prstGeom>
+        </p:spPr>
+        <p:style>
+          <a:lnRef idx="2">
+            <a:schemeClr val="accent1">
+              <a:shade val="50000"/>
+            </a:schemeClr>
+          </a:lnRef>
+          <a:fillRef idx="1">
+            <a:schemeClr val="accent1"/>
+          </a:fillRef>
+          <a:effectRef idx="0">
+            <a:schemeClr val="accent1"/>
+          </a:effectRef>
+          <a:fontRef idx="minor">
+            <a:schemeClr val="lt1"/>
+          </a:fontRef>
+        </p:style>
+        <p:txBody>
+          <a:bodyPr rtlCol="0" anchor="ctr"/>
+          <a:lstStyle/>
+          <a:p>
+            <a:pPr algn="ctr"/>
+            <a:r>
+              <a:rPr lang="en-US" dirty="0" err="1"/>
+              <a:t>Dockerfile.base</a:t>
+            </a:r>
+            <a:endParaRPr lang="en-US" dirty="0"/>
+          </a:p>
+        </p:txBody>
+      </p:sp>
+      <p:sp>
+        <p:nvSpPr>
+          <p:cNvPr id="5" name="Rectangle 4">
+            <a:extLst>
+              <a:ext uri="{FF2B5EF4-FFF2-40B4-BE49-F238E27FC236}">
+                <a16:creationId xmlns:a16="http://schemas.microsoft.com/office/drawing/2014/main" id="{2DCF867F-9617-456A-B10C-FA5A81590C1A}"/>
+              </a:ext>
+            </a:extLst>
+          </p:cNvPr>
+          <p:cNvSpPr/>
+          <p:nvPr/>
+        </p:nvSpPr>
+        <p:spPr>
+          <a:xfrm>
+            <a:off x="7022237" y="1314194"/>
+            <a:ext cx="3426780" cy="1731147"/>
+          </a:xfrm>
+          <a:prstGeom prst="rect">
+            <a:avLst/>
+          </a:prstGeom>
+        </p:spPr>
+        <p:style>
+          <a:lnRef idx="2">
+            <a:schemeClr val="accent1">
+              <a:shade val="50000"/>
+            </a:schemeClr>
+          </a:lnRef>
+          <a:fillRef idx="1">
+            <a:schemeClr val="accent1"/>
+          </a:fillRef>
+          <a:effectRef idx="0">
+            <a:schemeClr val="accent1"/>
+          </a:effectRef>
+          <a:fontRef idx="minor">
+            <a:schemeClr val="lt1"/>
+          </a:fontRef>
+        </p:style>
+        <p:txBody>
+          <a:bodyPr rtlCol="0" anchor="ctr"/>
+          <a:lstStyle/>
+          <a:p>
+            <a:pPr algn="ctr"/>
+            <a:r>
+              <a:rPr lang="en-US" dirty="0" err="1"/>
+              <a:t>src</a:t>
+            </a:r>
+            <a:r>
+              <a:rPr lang="en-US" dirty="0"/>
+              <a:t>/K8.FrontEnd/</a:t>
+            </a:r>
+            <a:r>
+              <a:rPr lang="en-US" dirty="0" err="1"/>
+              <a:t>Dockerfile</a:t>
+            </a:r>
+            <a:endParaRPr lang="en-US" dirty="0"/>
+          </a:p>
+        </p:txBody>
+      </p:sp>
+      <p:sp>
+        <p:nvSpPr>
+          <p:cNvPr id="7" name="Rectangle 6">
+            <a:extLst>
+              <a:ext uri="{FF2B5EF4-FFF2-40B4-BE49-F238E27FC236}">
+                <a16:creationId xmlns:a16="http://schemas.microsoft.com/office/drawing/2014/main" id="{7890AD21-F40C-45FD-A1A1-EE2377E2BC2E}"/>
+              </a:ext>
+            </a:extLst>
+          </p:cNvPr>
+          <p:cNvSpPr/>
+          <p:nvPr/>
+        </p:nvSpPr>
+        <p:spPr>
+          <a:xfrm>
+            <a:off x="7022237" y="3898451"/>
+            <a:ext cx="3519906" cy="1731147"/>
+          </a:xfrm>
+          <a:prstGeom prst="rect">
+            <a:avLst/>
+          </a:prstGeom>
+        </p:spPr>
+        <p:style>
+          <a:lnRef idx="2">
+            <a:schemeClr val="accent1">
+              <a:shade val="50000"/>
+            </a:schemeClr>
+          </a:lnRef>
+          <a:fillRef idx="1">
+            <a:schemeClr val="accent1"/>
+          </a:fillRef>
+          <a:effectRef idx="0">
+            <a:schemeClr val="accent1"/>
+          </a:effectRef>
+          <a:fontRef idx="minor">
+            <a:schemeClr val="lt1"/>
+          </a:fontRef>
+        </p:style>
+        <p:txBody>
+          <a:bodyPr rtlCol="0" anchor="ctr"/>
+          <a:lstStyle/>
+          <a:p>
+            <a:pPr algn="ctr"/>
+            <a:r>
+              <a:rPr lang="en-US" dirty="0" err="1"/>
+              <a:t>src</a:t>
+            </a:r>
+            <a:r>
+              <a:rPr lang="en-US" dirty="0"/>
+              <a:t>/K8.LongProcess/</a:t>
+            </a:r>
+            <a:r>
+              <a:rPr lang="en-US" dirty="0" err="1"/>
+              <a:t>Dockerfile</a:t>
+            </a:r>
+            <a:endParaRPr lang="en-US" dirty="0"/>
+          </a:p>
+        </p:txBody>
+      </p:sp>
+      <p:cxnSp>
+        <p:nvCxnSpPr>
+          <p:cNvPr id="9" name="Straight Arrow Connector 8">
+            <a:extLst>
+              <a:ext uri="{FF2B5EF4-FFF2-40B4-BE49-F238E27FC236}">
+                <a16:creationId xmlns:a16="http://schemas.microsoft.com/office/drawing/2014/main" id="{E7DE3DD7-7EA7-4B22-ABB0-F40C5A65A1DC}"/>
+              </a:ext>
+            </a:extLst>
+          </p:cNvPr>
+          <p:cNvCxnSpPr>
+            <a:cxnSpLocks/>
+            <a:endCxn id="5" idx="1"/>
+          </p:cNvCxnSpPr>
+          <p:nvPr/>
+        </p:nvCxnSpPr>
+        <p:spPr>
+          <a:xfrm flipV="1">
+            <a:off x="3444536" y="2179768"/>
+            <a:ext cx="3577701" cy="699856"/>
+          </a:xfrm>
+          <a:prstGeom prst="straightConnector1">
+            <a:avLst/>
+          </a:prstGeom>
+          <a:ln>
+            <a:tailEnd type="triangle"/>
+          </a:ln>
+        </p:spPr>
+        <p:style>
+          <a:lnRef idx="1">
+            <a:schemeClr val="accent1"/>
+          </a:lnRef>
+          <a:fillRef idx="0">
+            <a:schemeClr val="accent1"/>
+          </a:fillRef>
+          <a:effectRef idx="0">
+            <a:schemeClr val="accent1"/>
+          </a:effectRef>
+          <a:fontRef idx="minor">
+            <a:schemeClr val="tx1"/>
+          </a:fontRef>
+        </p:style>
+      </p:cxnSp>
+      <p:cxnSp>
+        <p:nvCxnSpPr>
+          <p:cNvPr id="12" name="Straight Arrow Connector 11">
+            <a:extLst>
+              <a:ext uri="{FF2B5EF4-FFF2-40B4-BE49-F238E27FC236}">
+                <a16:creationId xmlns:a16="http://schemas.microsoft.com/office/drawing/2014/main" id="{CD54EA79-25FE-40FE-8597-7645AD2CF83E}"/>
+              </a:ext>
+            </a:extLst>
+          </p:cNvPr>
+          <p:cNvCxnSpPr>
+            <a:cxnSpLocks/>
+            <a:stCxn id="4" idx="3"/>
+            <a:endCxn id="7" idx="1"/>
+          </p:cNvCxnSpPr>
+          <p:nvPr/>
+        </p:nvCxnSpPr>
+        <p:spPr>
+          <a:xfrm>
+            <a:off x="3568822" y="3341290"/>
+            <a:ext cx="3453415" cy="1422735"/>
+          </a:xfrm>
+          <a:prstGeom prst="straightConnector1">
+            <a:avLst/>
+          </a:prstGeom>
+          <a:ln>
+            <a:tailEnd type="triangle"/>
+          </a:ln>
+        </p:spPr>
+        <p:style>
+          <a:lnRef idx="1">
+            <a:schemeClr val="accent1"/>
+          </a:lnRef>
+          <a:fillRef idx="0">
+            <a:schemeClr val="accent1"/>
+          </a:fillRef>
+          <a:effectRef idx="0">
+            <a:schemeClr val="accent1"/>
+          </a:effectRef>
+          <a:fontRef idx="minor">
+            <a:schemeClr val="tx1"/>
+          </a:fontRef>
+        </p:style>
+      </p:cxnSp>
+      <p:sp>
+        <p:nvSpPr>
+          <p:cNvPr id="15" name="TextBox 14">
+            <a:extLst>
+              <a:ext uri="{FF2B5EF4-FFF2-40B4-BE49-F238E27FC236}">
+                <a16:creationId xmlns:a16="http://schemas.microsoft.com/office/drawing/2014/main" id="{ECEC0E8C-A39E-4A98-A1FC-43137A139CEE}"/>
+              </a:ext>
+            </a:extLst>
+          </p:cNvPr>
+          <p:cNvSpPr txBox="1"/>
+          <p:nvPr/>
+        </p:nvSpPr>
+        <p:spPr>
+          <a:xfrm>
+            <a:off x="745723" y="4292655"/>
+            <a:ext cx="2974020" cy="923330"/>
+          </a:xfrm>
+          <a:prstGeom prst="rect">
+            <a:avLst/>
+          </a:prstGeom>
+          <a:noFill/>
+        </p:spPr>
+        <p:txBody>
+          <a:bodyPr wrap="square" rtlCol="0">
+            <a:spAutoFit/>
+          </a:bodyPr>
+          <a:lstStyle/>
+          <a:p>
+            <a:r>
+              <a:rPr lang="en-US" dirty="0"/>
+              <a:t>Supports:</a:t>
+            </a:r>
+          </a:p>
+          <a:p>
+            <a:pPr marL="285750" indent="-285750">
+              <a:buFontTx/>
+              <a:buChar char="-"/>
+            </a:pPr>
+            <a:r>
+              <a:rPr lang="en-US" dirty="0"/>
+              <a:t>ONBUILD commands</a:t>
+            </a:r>
+          </a:p>
+          <a:p>
+            <a:pPr marL="285750" indent="-285750">
+              <a:buFontTx/>
+              <a:buChar char="-"/>
+            </a:pPr>
+            <a:r>
+              <a:rPr lang="en-US" dirty="0"/>
+              <a:t>CUSTOM NUGET FEED </a:t>
+            </a:r>
+          </a:p>
+        </p:txBody>
+      </p:sp>
+      <p:sp>
+        <p:nvSpPr>
+          <p:cNvPr id="17" name="TextBox 16">
+            <a:extLst>
+              <a:ext uri="{FF2B5EF4-FFF2-40B4-BE49-F238E27FC236}">
+                <a16:creationId xmlns:a16="http://schemas.microsoft.com/office/drawing/2014/main" id="{3794DBED-9ED4-4C48-8A4D-8D646D1CF1ED}"/>
+              </a:ext>
+            </a:extLst>
+          </p:cNvPr>
+          <p:cNvSpPr txBox="1"/>
+          <p:nvPr/>
+        </p:nvSpPr>
+        <p:spPr>
+          <a:xfrm>
+            <a:off x="7688062" y="3219814"/>
+            <a:ext cx="2760955" cy="369332"/>
+          </a:xfrm>
+          <a:prstGeom prst="rect">
+            <a:avLst/>
+          </a:prstGeom>
+          <a:noFill/>
+        </p:spPr>
+        <p:txBody>
+          <a:bodyPr wrap="square" rtlCol="0">
+            <a:spAutoFit/>
+          </a:bodyPr>
+          <a:lstStyle/>
+          <a:p>
+            <a:r>
+              <a:rPr lang="en-US" dirty="0" err="1"/>
+              <a:t>AspNetCore</a:t>
+            </a:r>
+            <a:r>
+              <a:rPr lang="en-US" dirty="0"/>
+              <a:t> Web </a:t>
+            </a:r>
+            <a:r>
+              <a:rPr lang="en-US" dirty="0" err="1"/>
+              <a:t>Api</a:t>
+            </a:r>
+            <a:endParaRPr lang="en-US" dirty="0"/>
+          </a:p>
+        </p:txBody>
+      </p:sp>
+      <p:sp>
+        <p:nvSpPr>
+          <p:cNvPr id="19" name="TextBox 18">
+            <a:extLst>
+              <a:ext uri="{FF2B5EF4-FFF2-40B4-BE49-F238E27FC236}">
+                <a16:creationId xmlns:a16="http://schemas.microsoft.com/office/drawing/2014/main" id="{3A9175D8-7B7F-4B6D-80B0-D550DE9C4BC0}"/>
+              </a:ext>
+            </a:extLst>
+          </p:cNvPr>
+          <p:cNvSpPr txBox="1"/>
+          <p:nvPr/>
+        </p:nvSpPr>
+        <p:spPr>
+          <a:xfrm>
+            <a:off x="7350711" y="5725094"/>
+            <a:ext cx="3280209" cy="923330"/>
+          </a:xfrm>
+          <a:prstGeom prst="rect">
+            <a:avLst/>
+          </a:prstGeom>
+          <a:noFill/>
+        </p:spPr>
+        <p:txBody>
+          <a:bodyPr wrap="square" rtlCol="0">
+            <a:spAutoFit/>
+          </a:bodyPr>
+          <a:lstStyle/>
+          <a:p>
+            <a:r>
+              <a:rPr lang="en-US" dirty="0" err="1"/>
+              <a:t>CronJobs</a:t>
+            </a:r>
+            <a:r>
+              <a:rPr lang="en-US" dirty="0"/>
+              <a:t>:</a:t>
+            </a:r>
+          </a:p>
+          <a:p>
+            <a:pPr marL="285750" indent="-285750">
+              <a:buFontTx/>
+              <a:buChar char="-"/>
+            </a:pPr>
+            <a:r>
+              <a:rPr lang="en-US" dirty="0"/>
+              <a:t>Import</a:t>
+            </a:r>
+          </a:p>
+          <a:p>
+            <a:pPr marL="285750" indent="-285750">
+              <a:buFontTx/>
+              <a:buChar char="-"/>
+            </a:pPr>
+            <a:r>
+              <a:rPr lang="en-US" dirty="0"/>
+              <a:t>Convert</a:t>
+            </a:r>
+          </a:p>
+        </p:txBody>
+      </p:sp>
+    </p:spTree>
+    <p:extLst>
+      <p:ext uri="{BB962C8B-B14F-4D97-AF65-F5344CB8AC3E}">
+        <p14:creationId xmlns:p14="http://schemas.microsoft.com/office/powerpoint/2010/main" val="2550661902"/>
       </p:ext>
     </p:extLst>
   </p:cSld>

</xml_diff>